<commit_message>
adding awacs and datalink, need corection for radar detection heading
</commit_message>
<xml_diff>
--- a/0_gestion/data_architectures.pptx
+++ b/0_gestion/data_architectures.pptx
@@ -5,11 +5,15 @@
     <p:sldMasterId id="2147483648" r:id="rId1"/>
   </p:sldMasterIdLst>
   <p:notesMasterIdLst>
-    <p:notesMasterId r:id="rId4"/>
+    <p:notesMasterId r:id="rId8"/>
   </p:notesMasterIdLst>
   <p:sldIdLst>
     <p:sldId id="256" r:id="rId2"/>
     <p:sldId id="257" r:id="rId3"/>
+    <p:sldId id="261" r:id="rId4"/>
+    <p:sldId id="258" r:id="rId5"/>
+    <p:sldId id="259" r:id="rId6"/>
+    <p:sldId id="260" r:id="rId7"/>
   </p:sldIdLst>
   <p:sldSz cx="12192000" cy="6858000"/>
   <p:notesSz cx="6858000" cy="9144000"/>
@@ -108,6 +112,11 @@
       </a:defRPr>
     </a:lvl9pPr>
   </p:defaultTextStyle>
+  <p:extLst>
+    <p:ext uri="{EFAFB233-063F-42B5-8137-9DF3F51BA10A}">
+      <p15:sldGuideLst xmlns:p15="http://schemas.microsoft.com/office/powerpoint/2012/main"/>
+    </p:ext>
+  </p:extLst>
 </p:presentation>
 </file>
 
@@ -193,7 +202,7 @@
           <a:p>
             <a:fld id="{5E589398-9D8C-4643-A2B2-CFE97ED62ED3}" type="datetimeFigureOut">
               <a:rPr lang="fr-FR" smtClean="0"/>
-              <a:t>28/07/2023</a:t>
+              <a:t>30/07/2023</a:t>
             </a:fld>
             <a:endParaRPr lang="fr-FR"/>
           </a:p>
@@ -691,7 +700,7 @@
           <a:p>
             <a:fld id="{F45835E6-AE1C-4ACB-B753-8ADE0DCB9D82}" type="datetimeFigureOut">
               <a:rPr lang="fr-FR" smtClean="0"/>
-              <a:t>28/07/2023</a:t>
+              <a:t>30/07/2023</a:t>
             </a:fld>
             <a:endParaRPr lang="fr-FR"/>
           </a:p>
@@ -889,7 +898,7 @@
           <a:p>
             <a:fld id="{F45835E6-AE1C-4ACB-B753-8ADE0DCB9D82}" type="datetimeFigureOut">
               <a:rPr lang="fr-FR" smtClean="0"/>
-              <a:t>28/07/2023</a:t>
+              <a:t>30/07/2023</a:t>
             </a:fld>
             <a:endParaRPr lang="fr-FR"/>
           </a:p>
@@ -1097,7 +1106,7 @@
           <a:p>
             <a:fld id="{F45835E6-AE1C-4ACB-B753-8ADE0DCB9D82}" type="datetimeFigureOut">
               <a:rPr lang="fr-FR" smtClean="0"/>
-              <a:t>28/07/2023</a:t>
+              <a:t>30/07/2023</a:t>
             </a:fld>
             <a:endParaRPr lang="fr-FR"/>
           </a:p>
@@ -1295,7 +1304,7 @@
           <a:p>
             <a:fld id="{F45835E6-AE1C-4ACB-B753-8ADE0DCB9D82}" type="datetimeFigureOut">
               <a:rPr lang="fr-FR" smtClean="0"/>
-              <a:t>28/07/2023</a:t>
+              <a:t>30/07/2023</a:t>
             </a:fld>
             <a:endParaRPr lang="fr-FR"/>
           </a:p>
@@ -1570,7 +1579,7 @@
           <a:p>
             <a:fld id="{F45835E6-AE1C-4ACB-B753-8ADE0DCB9D82}" type="datetimeFigureOut">
               <a:rPr lang="fr-FR" smtClean="0"/>
-              <a:t>28/07/2023</a:t>
+              <a:t>30/07/2023</a:t>
             </a:fld>
             <a:endParaRPr lang="fr-FR"/>
           </a:p>
@@ -1835,7 +1844,7 @@
           <a:p>
             <a:fld id="{F45835E6-AE1C-4ACB-B753-8ADE0DCB9D82}" type="datetimeFigureOut">
               <a:rPr lang="fr-FR" smtClean="0"/>
-              <a:t>28/07/2023</a:t>
+              <a:t>30/07/2023</a:t>
             </a:fld>
             <a:endParaRPr lang="fr-FR"/>
           </a:p>
@@ -2247,7 +2256,7 @@
           <a:p>
             <a:fld id="{F45835E6-AE1C-4ACB-B753-8ADE0DCB9D82}" type="datetimeFigureOut">
               <a:rPr lang="fr-FR" smtClean="0"/>
-              <a:t>28/07/2023</a:t>
+              <a:t>30/07/2023</a:t>
             </a:fld>
             <a:endParaRPr lang="fr-FR"/>
           </a:p>
@@ -2388,7 +2397,7 @@
           <a:p>
             <a:fld id="{F45835E6-AE1C-4ACB-B753-8ADE0DCB9D82}" type="datetimeFigureOut">
               <a:rPr lang="fr-FR" smtClean="0"/>
-              <a:t>28/07/2023</a:t>
+              <a:t>30/07/2023</a:t>
             </a:fld>
             <a:endParaRPr lang="fr-FR"/>
           </a:p>
@@ -2501,7 +2510,7 @@
           <a:p>
             <a:fld id="{F45835E6-AE1C-4ACB-B753-8ADE0DCB9D82}" type="datetimeFigureOut">
               <a:rPr lang="fr-FR" smtClean="0"/>
-              <a:t>28/07/2023</a:t>
+              <a:t>30/07/2023</a:t>
             </a:fld>
             <a:endParaRPr lang="fr-FR"/>
           </a:p>
@@ -2812,7 +2821,7 @@
           <a:p>
             <a:fld id="{F45835E6-AE1C-4ACB-B753-8ADE0DCB9D82}" type="datetimeFigureOut">
               <a:rPr lang="fr-FR" smtClean="0"/>
-              <a:t>28/07/2023</a:t>
+              <a:t>30/07/2023</a:t>
             </a:fld>
             <a:endParaRPr lang="fr-FR"/>
           </a:p>
@@ -3100,7 +3109,7 @@
           <a:p>
             <a:fld id="{F45835E6-AE1C-4ACB-B753-8ADE0DCB9D82}" type="datetimeFigureOut">
               <a:rPr lang="fr-FR" smtClean="0"/>
-              <a:t>28/07/2023</a:t>
+              <a:t>30/07/2023</a:t>
             </a:fld>
             <a:endParaRPr lang="fr-FR"/>
           </a:p>
@@ -3341,7 +3350,7 @@
           <a:p>
             <a:fld id="{F45835E6-AE1C-4ACB-B753-8ADE0DCB9D82}" type="datetimeFigureOut">
               <a:rPr lang="fr-FR" smtClean="0"/>
-              <a:t>28/07/2023</a:t>
+              <a:t>30/07/2023</a:t>
             </a:fld>
             <a:endParaRPr lang="fr-FR"/>
           </a:p>
@@ -3914,7 +3923,7 @@
           <a:lstStyle/>
           <a:p>
             <a:pPr algn="ctr"/>
-            <a:endParaRPr lang="fr-FR">
+            <a:endParaRPr lang="fr-FR" dirty="0">
               <a:solidFill>
                 <a:schemeClr val="bg1"/>
               </a:solidFill>
@@ -4753,6 +4762,1510 @@
     <p:extLst>
       <p:ext uri="{BB962C8B-B14F-4D97-AF65-F5344CB8AC3E}">
         <p14:creationId xmlns:p14="http://schemas.microsoft.com/office/powerpoint/2010/main" val="1362157485"/>
+      </p:ext>
+    </p:extLst>
+  </p:cSld>
+  <p:clrMapOvr>
+    <a:masterClrMapping/>
+  </p:clrMapOvr>
+</p:sld>
+</file>
+
+<file path=ppt/slides/slide3.xml><?xml version="1.0" encoding="utf-8"?>
+<p:sld xmlns:a="http://schemas.openxmlformats.org/drawingml/2006/main" xmlns:r="http://schemas.openxmlformats.org/officeDocument/2006/relationships" xmlns:p="http://schemas.openxmlformats.org/presentationml/2006/main">
+  <p:cSld>
+    <p:spTree>
+      <p:nvGrpSpPr>
+        <p:cNvPr id="1" name=""/>
+        <p:cNvGrpSpPr/>
+        <p:nvPr/>
+      </p:nvGrpSpPr>
+      <p:grpSpPr>
+        <a:xfrm>
+          <a:off x="0" y="0"/>
+          <a:ext cx="0" cy="0"/>
+          <a:chOff x="0" y="0"/>
+          <a:chExt cx="0" cy="0"/>
+        </a:xfrm>
+      </p:grpSpPr>
+      <p:sp>
+        <p:nvSpPr>
+          <p:cNvPr id="2" name="Titre 1">
+            <a:extLst>
+              <a:ext uri="{FF2B5EF4-FFF2-40B4-BE49-F238E27FC236}">
+                <a16:creationId xmlns:a16="http://schemas.microsoft.com/office/drawing/2014/main" id="{C2DADACB-8412-7E39-DDA9-7E4D065B5AFD}"/>
+              </a:ext>
+            </a:extLst>
+          </p:cNvPr>
+          <p:cNvSpPr>
+            <a:spLocks noGrp="1"/>
+          </p:cNvSpPr>
+          <p:nvPr>
+            <p:ph type="title"/>
+          </p:nvPr>
+        </p:nvSpPr>
+        <p:spPr/>
+        <p:txBody>
+          <a:bodyPr/>
+          <a:lstStyle/>
+          <a:p>
+            <a:r>
+              <a:rPr lang="fr-FR" dirty="0" err="1"/>
+              <a:t>Datalink</a:t>
+            </a:r>
+            <a:r>
+              <a:rPr lang="fr-FR" dirty="0"/>
+              <a:t> message</a:t>
+            </a:r>
+          </a:p>
+        </p:txBody>
+      </p:sp>
+      <p:sp>
+        <p:nvSpPr>
+          <p:cNvPr id="3" name="Espace réservé du contenu 2">
+            <a:extLst>
+              <a:ext uri="{FF2B5EF4-FFF2-40B4-BE49-F238E27FC236}">
+                <a16:creationId xmlns:a16="http://schemas.microsoft.com/office/drawing/2014/main" id="{43195F99-32DA-B6F1-8186-116E449A7844}"/>
+              </a:ext>
+            </a:extLst>
+          </p:cNvPr>
+          <p:cNvSpPr>
+            <a:spLocks noGrp="1"/>
+          </p:cNvSpPr>
+          <p:nvPr>
+            <p:ph idx="1"/>
+          </p:nvPr>
+        </p:nvSpPr>
+        <p:spPr/>
+        <p:txBody>
+          <a:bodyPr/>
+          <a:lstStyle/>
+          <a:p>
+            <a:pPr marL="0" indent="0">
+              <a:buNone/>
+            </a:pPr>
+            <a:r>
+              <a:rPr lang="en-US" dirty="0"/>
+              <a:t>Datalink message have an origin, a power, and a channel. </a:t>
+            </a:r>
+          </a:p>
+          <a:p>
+            <a:pPr marL="0" indent="0">
+              <a:buNone/>
+            </a:pPr>
+            <a:r>
+              <a:rPr lang="en-US" dirty="0"/>
+              <a:t>Passive EW can hear and get the azimuth of all message, but can’t read message. </a:t>
+            </a:r>
+          </a:p>
+          <a:p>
+            <a:pPr marL="0" indent="0">
+              <a:buNone/>
+            </a:pPr>
+            <a:r>
+              <a:rPr lang="en-US" dirty="0"/>
+              <a:t>Radio can read message.</a:t>
+            </a:r>
+          </a:p>
+          <a:p>
+            <a:pPr marL="0" indent="0">
+              <a:buNone/>
+            </a:pPr>
+            <a:r>
+              <a:rPr lang="en-US" dirty="0"/>
+              <a:t>Message have a power. A low power far message won’t be detected and </a:t>
+            </a:r>
+            <a:r>
+              <a:rPr lang="en-US" dirty="0" err="1"/>
+              <a:t>readed</a:t>
+            </a:r>
+            <a:r>
+              <a:rPr lang="en-US" dirty="0"/>
+              <a:t>.</a:t>
+            </a:r>
+          </a:p>
+          <a:p>
+            <a:pPr marL="0" indent="0">
+              <a:buNone/>
+            </a:pPr>
+            <a:endParaRPr lang="en-US" dirty="0"/>
+          </a:p>
+        </p:txBody>
+      </p:sp>
+    </p:spTree>
+    <p:extLst>
+      <p:ext uri="{BB962C8B-B14F-4D97-AF65-F5344CB8AC3E}">
+        <p14:creationId xmlns:p14="http://schemas.microsoft.com/office/powerpoint/2010/main" val="3356184777"/>
+      </p:ext>
+    </p:extLst>
+  </p:cSld>
+  <p:clrMapOvr>
+    <a:masterClrMapping/>
+  </p:clrMapOvr>
+</p:sld>
+</file>
+
+<file path=ppt/slides/slide4.xml><?xml version="1.0" encoding="utf-8"?>
+<p:sld xmlns:a="http://schemas.openxmlformats.org/drawingml/2006/main" xmlns:r="http://schemas.openxmlformats.org/officeDocument/2006/relationships" xmlns:p="http://schemas.openxmlformats.org/presentationml/2006/main">
+  <p:cSld>
+    <p:spTree>
+      <p:nvGrpSpPr>
+        <p:cNvPr id="1" name=""/>
+        <p:cNvGrpSpPr/>
+        <p:nvPr/>
+      </p:nvGrpSpPr>
+      <p:grpSpPr>
+        <a:xfrm>
+          <a:off x="0" y="0"/>
+          <a:ext cx="0" cy="0"/>
+          <a:chOff x="0" y="0"/>
+          <a:chExt cx="0" cy="0"/>
+        </a:xfrm>
+      </p:grpSpPr>
+      <p:sp>
+        <p:nvSpPr>
+          <p:cNvPr id="2" name="Titre 1">
+            <a:extLst>
+              <a:ext uri="{FF2B5EF4-FFF2-40B4-BE49-F238E27FC236}">
+                <a16:creationId xmlns:a16="http://schemas.microsoft.com/office/drawing/2014/main" id="{C2DADACB-8412-7E39-DDA9-7E4D065B5AFD}"/>
+              </a:ext>
+            </a:extLst>
+          </p:cNvPr>
+          <p:cNvSpPr>
+            <a:spLocks noGrp="1"/>
+          </p:cNvSpPr>
+          <p:nvPr>
+            <p:ph type="title"/>
+          </p:nvPr>
+        </p:nvSpPr>
+        <p:spPr/>
+        <p:txBody>
+          <a:bodyPr/>
+          <a:lstStyle/>
+          <a:p>
+            <a:r>
+              <a:rPr lang="fr-FR" dirty="0"/>
+              <a:t>EWS : radar </a:t>
+            </a:r>
+            <a:r>
+              <a:rPr lang="fr-FR" dirty="0" err="1"/>
+              <a:t>detection</a:t>
+            </a:r>
+            <a:r>
+              <a:rPr lang="fr-FR" dirty="0"/>
+              <a:t> (To do)</a:t>
+            </a:r>
+          </a:p>
+        </p:txBody>
+      </p:sp>
+      <p:sp>
+        <p:nvSpPr>
+          <p:cNvPr id="3" name="Espace réservé du contenu 2">
+            <a:extLst>
+              <a:ext uri="{FF2B5EF4-FFF2-40B4-BE49-F238E27FC236}">
+                <a16:creationId xmlns:a16="http://schemas.microsoft.com/office/drawing/2014/main" id="{43195F99-32DA-B6F1-8186-116E449A7844}"/>
+              </a:ext>
+            </a:extLst>
+          </p:cNvPr>
+          <p:cNvSpPr>
+            <a:spLocks noGrp="1"/>
+          </p:cNvSpPr>
+          <p:nvPr>
+            <p:ph idx="1"/>
+          </p:nvPr>
+        </p:nvSpPr>
+        <p:spPr/>
+        <p:txBody>
+          <a:bodyPr/>
+          <a:lstStyle/>
+          <a:p>
+            <a:pPr marL="0" indent="0">
+              <a:buNone/>
+            </a:pPr>
+            <a:r>
+              <a:rPr lang="en-US" dirty="0"/>
+              <a:t>Condition for radar detection of a target : </a:t>
+            </a:r>
+          </a:p>
+          <a:p>
+            <a:pPr>
+              <a:buFontTx/>
+              <a:buChar char="-"/>
+            </a:pPr>
+            <a:r>
+              <a:rPr lang="en-US" dirty="0"/>
+              <a:t>The target is in a detectable distance from the seeking plane</a:t>
+            </a:r>
+          </a:p>
+          <a:p>
+            <a:pPr>
+              <a:buFontTx/>
+              <a:buChar char="-"/>
+            </a:pPr>
+            <a:r>
+              <a:rPr lang="en-US" dirty="0"/>
+              <a:t>The target is in the good angle in ref to the seeking plane</a:t>
+            </a:r>
+          </a:p>
+          <a:p>
+            <a:pPr>
+              <a:buFontTx/>
+              <a:buChar char="-"/>
+            </a:pPr>
+            <a:r>
+              <a:rPr lang="en-US" dirty="0"/>
+              <a:t>The energy received by the seeking plane is sufficient</a:t>
+            </a:r>
+          </a:p>
+        </p:txBody>
+      </p:sp>
+      <mc:AlternateContent xmlns:mc="http://schemas.openxmlformats.org/markup-compatibility/2006" xmlns:a14="http://schemas.microsoft.com/office/drawing/2010/main">
+        <mc:Choice Requires="a14">
+          <p:sp>
+            <p:nvSpPr>
+              <p:cNvPr id="4" name="ZoneTexte 3">
+                <a:extLst>
+                  <a:ext uri="{FF2B5EF4-FFF2-40B4-BE49-F238E27FC236}">
+                    <a16:creationId xmlns:a16="http://schemas.microsoft.com/office/drawing/2014/main" id="{1E9BAF70-813E-2694-F866-AE439FAF3BC4}"/>
+                  </a:ext>
+                </a:extLst>
+              </p:cNvPr>
+              <p:cNvSpPr txBox="1"/>
+              <p:nvPr/>
+            </p:nvSpPr>
+            <p:spPr>
+              <a:xfrm>
+                <a:off x="4697506" y="4380940"/>
+                <a:ext cx="1692899" cy="595035"/>
+              </a:xfrm>
+              <a:prstGeom prst="rect">
+                <a:avLst/>
+              </a:prstGeom>
+              <a:noFill/>
+            </p:spPr>
+            <p:txBody>
+              <a:bodyPr wrap="none" lIns="0" tIns="0" rIns="0" bIns="0" rtlCol="0">
+                <a:spAutoFit/>
+              </a:bodyPr>
+              <a:lstStyle/>
+              <a:p>
+                <a:pPr/>
+                <a14:m>
+                  <m:oMathPara xmlns:m="http://schemas.openxmlformats.org/officeDocument/2006/math">
+                    <m:oMathParaPr>
+                      <m:jc m:val="centerGroup"/>
+                    </m:oMathParaPr>
+                    <m:oMath xmlns:m="http://schemas.openxmlformats.org/officeDocument/2006/math">
+                      <m:sSub>
+                        <m:sSubPr>
+                          <m:ctrlPr>
+                            <a:rPr lang="fr-FR" b="0" i="1" smtClean="0">
+                              <a:latin typeface="Cambria Math" panose="02040503050406030204" pitchFamily="18" charset="0"/>
+                            </a:rPr>
+                          </m:ctrlPr>
+                        </m:sSubPr>
+                        <m:e>
+                          <m:r>
+                            <a:rPr lang="fr-FR" b="0" i="1" smtClean="0">
+                              <a:latin typeface="Cambria Math" panose="02040503050406030204" pitchFamily="18" charset="0"/>
+                            </a:rPr>
+                            <m:t>𝑃</m:t>
+                          </m:r>
+                        </m:e>
+                        <m:sub>
+                          <m:r>
+                            <a:rPr lang="fr-FR" b="0" i="1" smtClean="0">
+                              <a:latin typeface="Cambria Math" panose="02040503050406030204" pitchFamily="18" charset="0"/>
+                            </a:rPr>
+                            <m:t>𝑟</m:t>
+                          </m:r>
+                        </m:sub>
+                      </m:sSub>
+                      <m:r>
+                        <a:rPr lang="fr-FR" b="0" i="1" smtClean="0">
+                          <a:latin typeface="Cambria Math" panose="02040503050406030204" pitchFamily="18" charset="0"/>
+                        </a:rPr>
+                        <m:t>=</m:t>
+                      </m:r>
+                      <m:sSub>
+                        <m:sSubPr>
+                          <m:ctrlPr>
+                            <a:rPr lang="fr-FR" b="0" i="1" smtClean="0">
+                              <a:latin typeface="Cambria Math" panose="02040503050406030204" pitchFamily="18" charset="0"/>
+                            </a:rPr>
+                          </m:ctrlPr>
+                        </m:sSubPr>
+                        <m:e>
+                          <m:r>
+                            <a:rPr lang="fr-FR" b="0" i="1" smtClean="0">
+                              <a:latin typeface="Cambria Math" panose="02040503050406030204" pitchFamily="18" charset="0"/>
+                            </a:rPr>
+                            <m:t>𝑃</m:t>
+                          </m:r>
+                        </m:e>
+                        <m:sub>
+                          <m:r>
+                            <a:rPr lang="fr-FR" b="0" i="1" smtClean="0">
+                              <a:latin typeface="Cambria Math" panose="02040503050406030204" pitchFamily="18" charset="0"/>
+                            </a:rPr>
+                            <m:t>𝑡</m:t>
+                          </m:r>
+                        </m:sub>
+                      </m:sSub>
+                      <m:r>
+                        <a:rPr lang="fr-FR" b="0" i="1" smtClean="0">
+                          <a:latin typeface="Cambria Math" panose="02040503050406030204" pitchFamily="18" charset="0"/>
+                        </a:rPr>
+                        <m:t> </m:t>
+                      </m:r>
+                      <m:f>
+                        <m:fPr>
+                          <m:ctrlPr>
+                            <a:rPr lang="fr-FR" b="0" i="1" smtClean="0">
+                              <a:latin typeface="Cambria Math" panose="02040503050406030204" pitchFamily="18" charset="0"/>
+                            </a:rPr>
+                          </m:ctrlPr>
+                        </m:fPr>
+                        <m:num>
+                          <m:sSub>
+                            <m:sSubPr>
+                              <m:ctrlPr>
+                                <a:rPr lang="fr-FR" b="0" i="1" smtClean="0">
+                                  <a:latin typeface="Cambria Math" panose="02040503050406030204" pitchFamily="18" charset="0"/>
+                                </a:rPr>
+                              </m:ctrlPr>
+                            </m:sSubPr>
+                            <m:e>
+                              <m:r>
+                                <a:rPr lang="fr-FR" b="0" i="1" smtClean="0">
+                                  <a:latin typeface="Cambria Math" panose="02040503050406030204" pitchFamily="18" charset="0"/>
+                                </a:rPr>
+                                <m:t>𝐺</m:t>
+                              </m:r>
+                            </m:e>
+                            <m:sub>
+                              <m:r>
+                                <a:rPr lang="fr-FR" b="0" i="1" smtClean="0">
+                                  <a:latin typeface="Cambria Math" panose="02040503050406030204" pitchFamily="18" charset="0"/>
+                                </a:rPr>
+                                <m:t>𝑡</m:t>
+                              </m:r>
+                            </m:sub>
+                          </m:sSub>
+                          <m:sSub>
+                            <m:sSubPr>
+                              <m:ctrlPr>
+                                <a:rPr lang="fr-FR" b="0" i="1" smtClean="0">
+                                  <a:latin typeface="Cambria Math" panose="02040503050406030204" pitchFamily="18" charset="0"/>
+                                </a:rPr>
+                              </m:ctrlPr>
+                            </m:sSubPr>
+                            <m:e>
+                              <m:r>
+                                <a:rPr lang="fr-FR" b="0" i="1" smtClean="0">
+                                  <a:latin typeface="Cambria Math" panose="02040503050406030204" pitchFamily="18" charset="0"/>
+                                </a:rPr>
+                                <m:t>𝐺</m:t>
+                              </m:r>
+                            </m:e>
+                            <m:sub>
+                              <m:r>
+                                <a:rPr lang="fr-FR" b="0" i="1" smtClean="0">
+                                  <a:latin typeface="Cambria Math" panose="02040503050406030204" pitchFamily="18" charset="0"/>
+                                </a:rPr>
+                                <m:t>𝑟</m:t>
+                              </m:r>
+                            </m:sub>
+                          </m:sSub>
+                          <m:sSup>
+                            <m:sSupPr>
+                              <m:ctrlPr>
+                                <a:rPr lang="fr-FR" b="0" i="1" smtClean="0">
+                                  <a:latin typeface="Cambria Math" panose="02040503050406030204" pitchFamily="18" charset="0"/>
+                                </a:rPr>
+                              </m:ctrlPr>
+                            </m:sSupPr>
+                            <m:e>
+                              <m:r>
+                                <m:rPr>
+                                  <m:sty m:val="p"/>
+                                </m:rPr>
+                                <a:rPr lang="el-GR" b="0" i="1" smtClean="0">
+                                  <a:latin typeface="Cambria Math" panose="02040503050406030204" pitchFamily="18" charset="0"/>
+                                </a:rPr>
+                                <m:t>λ</m:t>
+                              </m:r>
+                            </m:e>
+                            <m:sup>
+                              <m:r>
+                                <a:rPr lang="fr-FR" b="0" i="1" smtClean="0">
+                                  <a:latin typeface="Cambria Math" panose="02040503050406030204" pitchFamily="18" charset="0"/>
+                                </a:rPr>
+                                <m:t>2</m:t>
+                              </m:r>
+                            </m:sup>
+                          </m:sSup>
+                          <m:r>
+                            <m:rPr>
+                              <m:sty m:val="p"/>
+                            </m:rPr>
+                            <a:rPr lang="el-GR" b="0" i="1" smtClean="0">
+                              <a:latin typeface="Cambria Math" panose="02040503050406030204" pitchFamily="18" charset="0"/>
+                            </a:rPr>
+                            <m:t>σ</m:t>
+                          </m:r>
+                        </m:num>
+                        <m:den>
+                          <m:sSup>
+                            <m:sSupPr>
+                              <m:ctrlPr>
+                                <a:rPr lang="fr-FR" b="0" i="1" smtClean="0">
+                                  <a:latin typeface="Cambria Math" panose="02040503050406030204" pitchFamily="18" charset="0"/>
+                                </a:rPr>
+                              </m:ctrlPr>
+                            </m:sSupPr>
+                            <m:e>
+                              <m:d>
+                                <m:dPr>
+                                  <m:ctrlPr>
+                                    <a:rPr lang="fr-FR" b="0" i="1" smtClean="0">
+                                      <a:latin typeface="Cambria Math" panose="02040503050406030204" pitchFamily="18" charset="0"/>
+                                    </a:rPr>
+                                  </m:ctrlPr>
+                                </m:dPr>
+                                <m:e>
+                                  <m:r>
+                                    <a:rPr lang="fr-FR" b="0" i="1" smtClean="0">
+                                      <a:latin typeface="Cambria Math" panose="02040503050406030204" pitchFamily="18" charset="0"/>
+                                    </a:rPr>
+                                    <m:t>4</m:t>
+                                  </m:r>
+                                  <m:r>
+                                    <m:rPr>
+                                      <m:sty m:val="p"/>
+                                    </m:rPr>
+                                    <a:rPr lang="el-GR" b="0" i="1" smtClean="0">
+                                      <a:latin typeface="Cambria Math" panose="02040503050406030204" pitchFamily="18" charset="0"/>
+                                    </a:rPr>
+                                    <m:t>π</m:t>
+                                  </m:r>
+                                </m:e>
+                              </m:d>
+                            </m:e>
+                            <m:sup>
+                              <m:r>
+                                <a:rPr lang="fr-FR" b="0" i="1" smtClean="0">
+                                  <a:latin typeface="Cambria Math" panose="02040503050406030204" pitchFamily="18" charset="0"/>
+                                </a:rPr>
+                                <m:t>3</m:t>
+                              </m:r>
+                            </m:sup>
+                          </m:sSup>
+                          <m:sSup>
+                            <m:sSupPr>
+                              <m:ctrlPr>
+                                <a:rPr lang="fr-FR" b="0" i="1" smtClean="0">
+                                  <a:latin typeface="Cambria Math" panose="02040503050406030204" pitchFamily="18" charset="0"/>
+                                </a:rPr>
+                              </m:ctrlPr>
+                            </m:sSupPr>
+                            <m:e>
+                              <m:r>
+                                <a:rPr lang="fr-FR" b="0" i="1" smtClean="0">
+                                  <a:latin typeface="Cambria Math" panose="02040503050406030204" pitchFamily="18" charset="0"/>
+                                </a:rPr>
+                                <m:t>𝐷</m:t>
+                              </m:r>
+                            </m:e>
+                            <m:sup>
+                              <m:r>
+                                <a:rPr lang="fr-FR" b="0" i="1" smtClean="0">
+                                  <a:latin typeface="Cambria Math" panose="02040503050406030204" pitchFamily="18" charset="0"/>
+                                </a:rPr>
+                                <m:t>4</m:t>
+                              </m:r>
+                            </m:sup>
+                          </m:sSup>
+                        </m:den>
+                      </m:f>
+                    </m:oMath>
+                  </m:oMathPara>
+                </a14:m>
+                <a:endParaRPr lang="fr-FR" dirty="0"/>
+              </a:p>
+            </p:txBody>
+          </p:sp>
+        </mc:Choice>
+        <mc:Fallback xmlns="">
+          <p:sp>
+            <p:nvSpPr>
+              <p:cNvPr id="4" name="ZoneTexte 3">
+                <a:extLst>
+                  <a:ext uri="{FF2B5EF4-FFF2-40B4-BE49-F238E27FC236}">
+                    <a16:creationId xmlns:a16="http://schemas.microsoft.com/office/drawing/2014/main" id="{1E9BAF70-813E-2694-F866-AE439FAF3BC4}"/>
+                  </a:ext>
+                </a:extLst>
+              </p:cNvPr>
+              <p:cNvSpPr txBox="1">
+                <a:spLocks noRot="1" noChangeAspect="1" noMove="1" noResize="1" noEditPoints="1" noAdjustHandles="1" noChangeArrowheads="1" noChangeShapeType="1" noTextEdit="1"/>
+              </p:cNvSpPr>
+              <p:nvPr/>
+            </p:nvSpPr>
+            <p:spPr>
+              <a:xfrm>
+                <a:off x="4697506" y="4380940"/>
+                <a:ext cx="1692899" cy="595035"/>
+              </a:xfrm>
+              <a:prstGeom prst="rect">
+                <a:avLst/>
+              </a:prstGeom>
+              <a:blipFill>
+                <a:blip r:embed="rId2"/>
+                <a:stretch>
+                  <a:fillRect b="-1031"/>
+                </a:stretch>
+              </a:blipFill>
+            </p:spPr>
+            <p:txBody>
+              <a:bodyPr/>
+              <a:lstStyle/>
+              <a:p>
+                <a:r>
+                  <a:rPr lang="fr-FR">
+                    <a:noFill/>
+                  </a:rPr>
+                  <a:t> </a:t>
+                </a:r>
+              </a:p>
+            </p:txBody>
+          </p:sp>
+        </mc:Fallback>
+      </mc:AlternateContent>
+      <mc:AlternateContent xmlns:mc="http://schemas.openxmlformats.org/markup-compatibility/2006" xmlns:a14="http://schemas.microsoft.com/office/drawing/2010/main">
+        <mc:Choice Requires="a14">
+          <p:sp>
+            <p:nvSpPr>
+              <p:cNvPr id="5" name="ZoneTexte 4">
+                <a:extLst>
+                  <a:ext uri="{FF2B5EF4-FFF2-40B4-BE49-F238E27FC236}">
+                    <a16:creationId xmlns:a16="http://schemas.microsoft.com/office/drawing/2014/main" id="{E2130FD0-DFDB-7D2C-A6E3-F4FE63AF2AF1}"/>
+                  </a:ext>
+                </a:extLst>
+              </p:cNvPr>
+              <p:cNvSpPr txBox="1"/>
+              <p:nvPr/>
+            </p:nvSpPr>
+            <p:spPr>
+              <a:xfrm>
+                <a:off x="1147481" y="4493792"/>
+                <a:ext cx="9323295" cy="1998752"/>
+              </a:xfrm>
+              <a:prstGeom prst="rect">
+                <a:avLst/>
+              </a:prstGeom>
+              <a:noFill/>
+            </p:spPr>
+            <p:txBody>
+              <a:bodyPr wrap="square" rtlCol="0">
+                <a:spAutoFit/>
+              </a:bodyPr>
+              <a:lstStyle/>
+              <a:p>
+                <a:r>
+                  <a:rPr lang="fr-FR" dirty="0"/>
+                  <a:t>The </a:t>
+                </a:r>
+                <a:r>
+                  <a:rPr lang="fr-FR" dirty="0" err="1"/>
+                  <a:t>equation</a:t>
+                </a:r>
+                <a:r>
+                  <a:rPr lang="fr-FR" dirty="0"/>
+                  <a:t> of </a:t>
+                </a:r>
+                <a:r>
+                  <a:rPr lang="fr-FR" dirty="0" err="1"/>
+                  <a:t>received</a:t>
+                </a:r>
+                <a:r>
+                  <a:rPr lang="fr-FR" dirty="0"/>
+                  <a:t> power </a:t>
+                </a:r>
+                <a:r>
+                  <a:rPr lang="fr-FR" dirty="0" err="1"/>
+                  <a:t>is</a:t>
+                </a:r>
+                <a:r>
+                  <a:rPr lang="fr-FR" dirty="0"/>
+                  <a:t> : </a:t>
+                </a:r>
+              </a:p>
+              <a:p>
+                <a:endParaRPr lang="fr-FR" dirty="0"/>
+              </a:p>
+              <a:p>
+                <a:r>
+                  <a:rPr lang="fr-FR" dirty="0" err="1"/>
+                  <a:t>Let’s</a:t>
+                </a:r>
+                <a:r>
+                  <a:rPr lang="fr-FR" dirty="0"/>
+                  <a:t> </a:t>
+                </a:r>
+                <a:r>
+                  <a:rPr lang="fr-FR" dirty="0" err="1"/>
+                  <a:t>consider</a:t>
+                </a:r>
+                <a:r>
+                  <a:rPr lang="fr-FR" dirty="0"/>
+                  <a:t> </a:t>
+                </a:r>
+                <a:r>
+                  <a:rPr lang="fr-FR" dirty="0" err="1"/>
+                  <a:t>that</a:t>
+                </a:r>
+                <a:r>
+                  <a:rPr lang="fr-FR" dirty="0"/>
+                  <a:t> the range of the radar </a:t>
+                </a:r>
+                <a:r>
+                  <a:rPr lang="fr-FR" dirty="0" err="1"/>
+                  <a:t>is</a:t>
+                </a:r>
+                <a:r>
+                  <a:rPr lang="fr-FR" dirty="0"/>
+                  <a:t> </a:t>
+                </a:r>
+                <a:r>
+                  <a:rPr lang="fr-FR" dirty="0" err="1"/>
+                  <a:t>Dmax</a:t>
+                </a:r>
+                <a:r>
+                  <a:rPr lang="fr-FR" dirty="0"/>
+                  <a:t> for a </a:t>
+                </a:r>
+                <a:r>
+                  <a:rPr lang="fr-FR" dirty="0" err="1"/>
+                  <a:t>rcs</a:t>
+                </a:r>
+                <a:r>
+                  <a:rPr lang="fr-FR" dirty="0"/>
+                  <a:t> of 1m^2 to deal as Pr=1</a:t>
+                </a:r>
+              </a:p>
+              <a:p>
+                <a:r>
+                  <a:rPr lang="fr-FR" dirty="0" err="1"/>
+                  <a:t>Let’s</a:t>
+                </a:r>
+                <a:r>
+                  <a:rPr lang="fr-FR" dirty="0"/>
+                  <a:t> </a:t>
+                </a:r>
+                <a:r>
+                  <a:rPr lang="fr-FR" dirty="0" err="1"/>
+                  <a:t>consider</a:t>
+                </a:r>
+                <a:r>
+                  <a:rPr lang="fr-FR" dirty="0"/>
+                  <a:t> </a:t>
+                </a:r>
+                <a:r>
+                  <a:rPr lang="fr-FR" dirty="0" err="1"/>
+                  <a:t>that</a:t>
+                </a:r>
+                <a:r>
+                  <a:rPr lang="fr-FR" dirty="0"/>
+                  <a:t> Pt, Gt, Gr, Lambda </a:t>
+                </a:r>
+                <a:r>
+                  <a:rPr lang="fr-FR" dirty="0" err="1"/>
+                  <a:t>squared</a:t>
+                </a:r>
+                <a:r>
+                  <a:rPr lang="fr-FR" dirty="0"/>
+                  <a:t> are a constant of the radar </a:t>
+                </a:r>
+                <a:r>
+                  <a:rPr lang="fr-FR" dirty="0" err="1"/>
+                  <a:t>that</a:t>
+                </a:r>
+                <a:r>
+                  <a:rPr lang="fr-FR" dirty="0"/>
+                  <a:t> </a:t>
+                </a:r>
+                <a:r>
+                  <a:rPr lang="fr-FR" dirty="0" err="1"/>
+                  <a:t>we</a:t>
+                </a:r>
+                <a:r>
+                  <a:rPr lang="fr-FR" dirty="0"/>
+                  <a:t> </a:t>
+                </a:r>
+                <a:r>
+                  <a:rPr lang="fr-FR" dirty="0" err="1"/>
+                  <a:t>will</a:t>
+                </a:r>
+                <a:r>
+                  <a:rPr lang="fr-FR" dirty="0"/>
+                  <a:t> </a:t>
+                </a:r>
+                <a:r>
+                  <a:rPr lang="fr-FR" dirty="0" err="1"/>
+                  <a:t>name</a:t>
+                </a:r>
+                <a:r>
+                  <a:rPr lang="fr-FR" dirty="0"/>
+                  <a:t> A, </a:t>
+                </a:r>
+                <a:r>
+                  <a:rPr lang="fr-FR" dirty="0" err="1"/>
+                  <a:t>with</a:t>
+                </a:r>
+                <a:r>
+                  <a:rPr lang="fr-FR" dirty="0"/>
+                  <a:t> </a:t>
+                </a:r>
+                <a14:m>
+                  <m:oMath xmlns:m="http://schemas.openxmlformats.org/officeDocument/2006/math">
+                    <m:sSub>
+                      <m:sSubPr>
+                        <m:ctrlPr>
+                          <a:rPr lang="fr-FR" b="0" i="1" smtClean="0">
+                            <a:latin typeface="Cambria Math" panose="02040503050406030204" pitchFamily="18" charset="0"/>
+                          </a:rPr>
+                        </m:ctrlPr>
+                      </m:sSubPr>
+                      <m:e>
+                        <m:r>
+                          <a:rPr lang="fr-FR" b="0" i="1" smtClean="0">
+                            <a:latin typeface="Cambria Math" panose="02040503050406030204" pitchFamily="18" charset="0"/>
+                          </a:rPr>
+                          <m:t>𝑃</m:t>
+                        </m:r>
+                      </m:e>
+                      <m:sub>
+                        <m:r>
+                          <a:rPr lang="fr-FR" b="0" i="1" smtClean="0">
+                            <a:latin typeface="Cambria Math" panose="02040503050406030204" pitchFamily="18" charset="0"/>
+                          </a:rPr>
+                          <m:t>𝑟</m:t>
+                        </m:r>
+                      </m:sub>
+                    </m:sSub>
+                    <m:r>
+                      <a:rPr lang="fr-FR" b="0" i="1" smtClean="0">
+                        <a:latin typeface="Cambria Math" panose="02040503050406030204" pitchFamily="18" charset="0"/>
+                      </a:rPr>
+                      <m:t>=</m:t>
+                    </m:r>
+                    <m:r>
+                      <a:rPr lang="fr-FR" b="0" i="1" smtClean="0">
+                        <a:latin typeface="Cambria Math" panose="02040503050406030204" pitchFamily="18" charset="0"/>
+                      </a:rPr>
+                      <m:t>𝐴</m:t>
+                    </m:r>
+                    <m:r>
+                      <a:rPr lang="fr-FR" b="0" i="1" smtClean="0">
+                        <a:latin typeface="Cambria Math" panose="02040503050406030204" pitchFamily="18" charset="0"/>
+                      </a:rPr>
+                      <m:t> ∗</m:t>
+                    </m:r>
+                    <m:f>
+                      <m:fPr>
+                        <m:ctrlPr>
+                          <a:rPr lang="fr-FR" b="0" i="1" smtClean="0">
+                            <a:latin typeface="Cambria Math" panose="02040503050406030204" pitchFamily="18" charset="0"/>
+                          </a:rPr>
+                        </m:ctrlPr>
+                      </m:fPr>
+                      <m:num>
+                        <m:r>
+                          <a:rPr lang="fr-FR" b="0" i="1" smtClean="0">
+                            <a:latin typeface="Cambria Math" panose="02040503050406030204" pitchFamily="18" charset="0"/>
+                          </a:rPr>
+                          <m:t>𝑟𝑐𝑠</m:t>
+                        </m:r>
+                      </m:num>
+                      <m:den>
+                        <m:sSup>
+                          <m:sSupPr>
+                            <m:ctrlPr>
+                              <a:rPr lang="fr-FR" i="1">
+                                <a:latin typeface="Cambria Math" panose="02040503050406030204" pitchFamily="18" charset="0"/>
+                              </a:rPr>
+                            </m:ctrlPr>
+                          </m:sSupPr>
+                          <m:e>
+                            <m:d>
+                              <m:dPr>
+                                <m:ctrlPr>
+                                  <a:rPr lang="fr-FR" i="1">
+                                    <a:latin typeface="Cambria Math" panose="02040503050406030204" pitchFamily="18" charset="0"/>
+                                  </a:rPr>
+                                </m:ctrlPr>
+                              </m:dPr>
+                              <m:e>
+                                <m:r>
+                                  <a:rPr lang="fr-FR" i="1">
+                                    <a:latin typeface="Cambria Math" panose="02040503050406030204" pitchFamily="18" charset="0"/>
+                                  </a:rPr>
+                                  <m:t>4</m:t>
+                                </m:r>
+                                <m:r>
+                                  <m:rPr>
+                                    <m:sty m:val="p"/>
+                                  </m:rPr>
+                                  <a:rPr lang="el-GR" i="1">
+                                    <a:latin typeface="Cambria Math" panose="02040503050406030204" pitchFamily="18" charset="0"/>
+                                  </a:rPr>
+                                  <m:t>π</m:t>
+                                </m:r>
+                              </m:e>
+                            </m:d>
+                          </m:e>
+                          <m:sup>
+                            <m:r>
+                              <a:rPr lang="fr-FR" i="1">
+                                <a:latin typeface="Cambria Math" panose="02040503050406030204" pitchFamily="18" charset="0"/>
+                              </a:rPr>
+                              <m:t>3</m:t>
+                            </m:r>
+                          </m:sup>
+                        </m:sSup>
+                        <m:sSup>
+                          <m:sSupPr>
+                            <m:ctrlPr>
+                              <a:rPr lang="fr-FR" i="1">
+                                <a:latin typeface="Cambria Math" panose="02040503050406030204" pitchFamily="18" charset="0"/>
+                              </a:rPr>
+                            </m:ctrlPr>
+                          </m:sSupPr>
+                          <m:e>
+                            <m:r>
+                              <a:rPr lang="fr-FR" i="1">
+                                <a:latin typeface="Cambria Math" panose="02040503050406030204" pitchFamily="18" charset="0"/>
+                              </a:rPr>
+                              <m:t>𝐷</m:t>
+                            </m:r>
+                          </m:e>
+                          <m:sup>
+                            <m:r>
+                              <a:rPr lang="fr-FR" i="1">
+                                <a:latin typeface="Cambria Math" panose="02040503050406030204" pitchFamily="18" charset="0"/>
+                              </a:rPr>
+                              <m:t>4</m:t>
+                            </m:r>
+                          </m:sup>
+                        </m:sSup>
+                      </m:den>
+                    </m:f>
+                  </m:oMath>
+                </a14:m>
+                <a:r>
+                  <a:rPr lang="fr-FR" dirty="0"/>
+                  <a:t> </a:t>
+                </a:r>
+                <a:r>
+                  <a:rPr lang="fr-FR" dirty="0" err="1"/>
+                  <a:t>so</a:t>
+                </a:r>
+                <a:r>
+                  <a:rPr lang="fr-FR" dirty="0"/>
+                  <a:t> at </a:t>
+                </a:r>
+                <a:r>
+                  <a:rPr lang="fr-FR" dirty="0" err="1"/>
+                  <a:t>Dmax</a:t>
+                </a:r>
+                <a:r>
+                  <a:rPr lang="fr-FR" dirty="0"/>
+                  <a:t> Pr = 1 and </a:t>
+                </a:r>
+                <a:r>
+                  <a:rPr lang="fr-FR" dirty="0" err="1"/>
+                  <a:t>rcs</a:t>
+                </a:r>
+                <a:r>
+                  <a:rPr lang="fr-FR" dirty="0"/>
+                  <a:t> = 1 : </a:t>
+                </a:r>
+                <a14:m>
+                  <m:oMath xmlns:m="http://schemas.openxmlformats.org/officeDocument/2006/math">
+                    <m:r>
+                      <a:rPr lang="fr-FR" i="1">
+                        <a:latin typeface="Cambria Math" panose="02040503050406030204" pitchFamily="18" charset="0"/>
+                      </a:rPr>
+                      <m:t>𝐴</m:t>
+                    </m:r>
+                    <m:r>
+                      <a:rPr lang="fr-FR" b="0" i="0" smtClean="0">
+                        <a:latin typeface="Cambria Math" panose="02040503050406030204" pitchFamily="18" charset="0"/>
+                      </a:rPr>
+                      <m:t> </m:t>
+                    </m:r>
+                    <m:r>
+                      <a:rPr lang="fr-FR" i="1">
+                        <a:latin typeface="Cambria Math" panose="02040503050406030204" pitchFamily="18" charset="0"/>
+                      </a:rPr>
+                      <m:t>=</m:t>
+                    </m:r>
+                    <m:sSup>
+                      <m:sSupPr>
+                        <m:ctrlPr>
+                          <a:rPr lang="fr-FR" i="1">
+                            <a:latin typeface="Cambria Math" panose="02040503050406030204" pitchFamily="18" charset="0"/>
+                          </a:rPr>
+                        </m:ctrlPr>
+                      </m:sSupPr>
+                      <m:e>
+                        <m:d>
+                          <m:dPr>
+                            <m:ctrlPr>
+                              <a:rPr lang="fr-FR" i="1">
+                                <a:latin typeface="Cambria Math" panose="02040503050406030204" pitchFamily="18" charset="0"/>
+                              </a:rPr>
+                            </m:ctrlPr>
+                          </m:dPr>
+                          <m:e>
+                            <m:r>
+                              <a:rPr lang="fr-FR" i="1">
+                                <a:latin typeface="Cambria Math" panose="02040503050406030204" pitchFamily="18" charset="0"/>
+                              </a:rPr>
+                              <m:t>4</m:t>
+                            </m:r>
+                            <m:r>
+                              <m:rPr>
+                                <m:sty m:val="p"/>
+                              </m:rPr>
+                              <a:rPr lang="el-GR" i="1">
+                                <a:latin typeface="Cambria Math" panose="02040503050406030204" pitchFamily="18" charset="0"/>
+                              </a:rPr>
+                              <m:t>π</m:t>
+                            </m:r>
+                          </m:e>
+                        </m:d>
+                      </m:e>
+                      <m:sup>
+                        <m:r>
+                          <a:rPr lang="fr-FR" i="1">
+                            <a:latin typeface="Cambria Math" panose="02040503050406030204" pitchFamily="18" charset="0"/>
+                          </a:rPr>
+                          <m:t>3</m:t>
+                        </m:r>
+                      </m:sup>
+                    </m:sSup>
+                    <m:sSubSup>
+                      <m:sSubSupPr>
+                        <m:ctrlPr>
+                          <a:rPr lang="fr-FR" b="0" i="1" smtClean="0">
+                            <a:latin typeface="Cambria Math" panose="02040503050406030204" pitchFamily="18" charset="0"/>
+                          </a:rPr>
+                        </m:ctrlPr>
+                      </m:sSubSupPr>
+                      <m:e>
+                        <m:r>
+                          <a:rPr lang="fr-FR" i="1">
+                            <a:latin typeface="Cambria Math" panose="02040503050406030204" pitchFamily="18" charset="0"/>
+                          </a:rPr>
+                          <m:t>𝐷</m:t>
+                        </m:r>
+                      </m:e>
+                      <m:sub>
+                        <m:r>
+                          <a:rPr lang="fr-FR" b="0" i="1" smtClean="0">
+                            <a:latin typeface="Cambria Math" panose="02040503050406030204" pitchFamily="18" charset="0"/>
+                          </a:rPr>
+                          <m:t>𝑚𝑎𝑥</m:t>
+                        </m:r>
+                      </m:sub>
+                      <m:sup>
+                        <m:r>
+                          <a:rPr lang="fr-FR" i="1">
+                            <a:latin typeface="Cambria Math" panose="02040503050406030204" pitchFamily="18" charset="0"/>
+                          </a:rPr>
+                          <m:t>4</m:t>
+                        </m:r>
+                      </m:sup>
+                    </m:sSubSup>
+                  </m:oMath>
+                </a14:m>
+                <a:r>
+                  <a:rPr lang="fr-FR" dirty="0"/>
+                  <a:t>. </a:t>
+                </a:r>
+                <a:r>
+                  <a:rPr lang="fr-FR" dirty="0" err="1"/>
+                  <a:t>We</a:t>
+                </a:r>
+                <a:r>
+                  <a:rPr lang="fr-FR" dirty="0"/>
+                  <a:t> can </a:t>
+                </a:r>
+                <a:r>
+                  <a:rPr lang="fr-FR" dirty="0" err="1"/>
+                  <a:t>simplify</a:t>
+                </a:r>
+                <a:r>
+                  <a:rPr lang="fr-FR" dirty="0"/>
+                  <a:t> A and Pr by a factor </a:t>
+                </a:r>
+                <a14:m>
+                  <m:oMath xmlns:m="http://schemas.openxmlformats.org/officeDocument/2006/math">
+                    <m:sSup>
+                      <m:sSupPr>
+                        <m:ctrlPr>
+                          <a:rPr lang="fr-FR" i="1">
+                            <a:latin typeface="Cambria Math" panose="02040503050406030204" pitchFamily="18" charset="0"/>
+                          </a:rPr>
+                        </m:ctrlPr>
+                      </m:sSupPr>
+                      <m:e>
+                        <m:d>
+                          <m:dPr>
+                            <m:ctrlPr>
+                              <a:rPr lang="fr-FR" i="1">
+                                <a:latin typeface="Cambria Math" panose="02040503050406030204" pitchFamily="18" charset="0"/>
+                              </a:rPr>
+                            </m:ctrlPr>
+                          </m:dPr>
+                          <m:e>
+                            <m:r>
+                              <a:rPr lang="fr-FR" i="1">
+                                <a:latin typeface="Cambria Math" panose="02040503050406030204" pitchFamily="18" charset="0"/>
+                              </a:rPr>
+                              <m:t>4</m:t>
+                            </m:r>
+                            <m:r>
+                              <m:rPr>
+                                <m:sty m:val="p"/>
+                              </m:rPr>
+                              <a:rPr lang="el-GR" i="1">
+                                <a:latin typeface="Cambria Math" panose="02040503050406030204" pitchFamily="18" charset="0"/>
+                              </a:rPr>
+                              <m:t>π</m:t>
+                            </m:r>
+                          </m:e>
+                        </m:d>
+                      </m:e>
+                      <m:sup>
+                        <m:r>
+                          <a:rPr lang="fr-FR" i="1">
+                            <a:latin typeface="Cambria Math" panose="02040503050406030204" pitchFamily="18" charset="0"/>
+                          </a:rPr>
+                          <m:t>3</m:t>
+                        </m:r>
+                      </m:sup>
+                    </m:sSup>
+                  </m:oMath>
+                </a14:m>
+                <a:r>
+                  <a:rPr lang="fr-FR" dirty="0"/>
+                  <a:t> </a:t>
+                </a:r>
+                <a:r>
+                  <a:rPr lang="fr-FR" dirty="0" err="1"/>
+                  <a:t>giving</a:t>
+                </a:r>
+                <a:r>
+                  <a:rPr lang="fr-FR" dirty="0"/>
+                  <a:t> us the final </a:t>
+                </a:r>
+                <a:r>
+                  <a:rPr lang="fr-FR" dirty="0" err="1"/>
+                  <a:t>equation</a:t>
+                </a:r>
+                <a:r>
+                  <a:rPr lang="fr-FR" dirty="0"/>
+                  <a:t> </a:t>
+                </a:r>
+                <a14:m>
+                  <m:oMath xmlns:m="http://schemas.openxmlformats.org/officeDocument/2006/math">
+                    <m:sSub>
+                      <m:sSubPr>
+                        <m:ctrlPr>
+                          <a:rPr lang="fr-FR" i="1">
+                            <a:latin typeface="Cambria Math" panose="02040503050406030204" pitchFamily="18" charset="0"/>
+                          </a:rPr>
+                        </m:ctrlPr>
+                      </m:sSubPr>
+                      <m:e>
+                        <m:r>
+                          <a:rPr lang="fr-FR" i="1">
+                            <a:latin typeface="Cambria Math" panose="02040503050406030204" pitchFamily="18" charset="0"/>
+                          </a:rPr>
+                          <m:t>𝑃</m:t>
+                        </m:r>
+                      </m:e>
+                      <m:sub>
+                        <m:r>
+                          <a:rPr lang="fr-FR" i="1">
+                            <a:latin typeface="Cambria Math" panose="02040503050406030204" pitchFamily="18" charset="0"/>
+                          </a:rPr>
+                          <m:t>𝑟</m:t>
+                        </m:r>
+                      </m:sub>
+                    </m:sSub>
+                    <m:r>
+                      <a:rPr lang="fr-FR" i="1">
+                        <a:latin typeface="Cambria Math" panose="02040503050406030204" pitchFamily="18" charset="0"/>
+                      </a:rPr>
+                      <m:t>=</m:t>
+                    </m:r>
+                    <m:sSubSup>
+                      <m:sSubSupPr>
+                        <m:ctrlPr>
+                          <a:rPr lang="fr-FR" i="1">
+                            <a:latin typeface="Cambria Math" panose="02040503050406030204" pitchFamily="18" charset="0"/>
+                          </a:rPr>
+                        </m:ctrlPr>
+                      </m:sSubSupPr>
+                      <m:e>
+                        <m:r>
+                          <a:rPr lang="fr-FR" i="1">
+                            <a:latin typeface="Cambria Math" panose="02040503050406030204" pitchFamily="18" charset="0"/>
+                          </a:rPr>
+                          <m:t>𝐷</m:t>
+                        </m:r>
+                      </m:e>
+                      <m:sub>
+                        <m:r>
+                          <a:rPr lang="fr-FR" i="1">
+                            <a:latin typeface="Cambria Math" panose="02040503050406030204" pitchFamily="18" charset="0"/>
+                          </a:rPr>
+                          <m:t>𝑚𝑎𝑥</m:t>
+                        </m:r>
+                      </m:sub>
+                      <m:sup>
+                        <m:r>
+                          <a:rPr lang="fr-FR" i="1">
+                            <a:latin typeface="Cambria Math" panose="02040503050406030204" pitchFamily="18" charset="0"/>
+                          </a:rPr>
+                          <m:t>4</m:t>
+                        </m:r>
+                      </m:sup>
+                    </m:sSubSup>
+                    <m:r>
+                      <a:rPr lang="fr-FR" i="1">
+                        <a:latin typeface="Cambria Math" panose="02040503050406030204" pitchFamily="18" charset="0"/>
+                      </a:rPr>
+                      <m:t>∗</m:t>
+                    </m:r>
+                    <m:f>
+                      <m:fPr>
+                        <m:ctrlPr>
+                          <a:rPr lang="fr-FR" i="1">
+                            <a:latin typeface="Cambria Math" panose="02040503050406030204" pitchFamily="18" charset="0"/>
+                          </a:rPr>
+                        </m:ctrlPr>
+                      </m:fPr>
+                      <m:num>
+                        <m:r>
+                          <a:rPr lang="fr-FR" i="1">
+                            <a:latin typeface="Cambria Math" panose="02040503050406030204" pitchFamily="18" charset="0"/>
+                          </a:rPr>
+                          <m:t>𝑟𝑐𝑠</m:t>
+                        </m:r>
+                      </m:num>
+                      <m:den>
+                        <m:sSup>
+                          <m:sSupPr>
+                            <m:ctrlPr>
+                              <a:rPr lang="fr-FR" i="1">
+                                <a:latin typeface="Cambria Math" panose="02040503050406030204" pitchFamily="18" charset="0"/>
+                              </a:rPr>
+                            </m:ctrlPr>
+                          </m:sSupPr>
+                          <m:e>
+                            <m:r>
+                              <a:rPr lang="fr-FR" i="1">
+                                <a:latin typeface="Cambria Math" panose="02040503050406030204" pitchFamily="18" charset="0"/>
+                              </a:rPr>
+                              <m:t>𝐷</m:t>
+                            </m:r>
+                          </m:e>
+                          <m:sup>
+                            <m:r>
+                              <a:rPr lang="fr-FR" i="1">
+                                <a:latin typeface="Cambria Math" panose="02040503050406030204" pitchFamily="18" charset="0"/>
+                              </a:rPr>
+                              <m:t>4</m:t>
+                            </m:r>
+                          </m:sup>
+                        </m:sSup>
+                      </m:den>
+                    </m:f>
+                  </m:oMath>
+                </a14:m>
+                <a:r>
+                  <a:rPr lang="fr-FR" dirty="0"/>
+                  <a:t> </a:t>
+                </a:r>
+              </a:p>
+            </p:txBody>
+          </p:sp>
+        </mc:Choice>
+        <mc:Fallback xmlns="">
+          <p:sp>
+            <p:nvSpPr>
+              <p:cNvPr id="5" name="ZoneTexte 4">
+                <a:extLst>
+                  <a:ext uri="{FF2B5EF4-FFF2-40B4-BE49-F238E27FC236}">
+                    <a16:creationId xmlns:a16="http://schemas.microsoft.com/office/drawing/2014/main" id="{E2130FD0-DFDB-7D2C-A6E3-F4FE63AF2AF1}"/>
+                  </a:ext>
+                </a:extLst>
+              </p:cNvPr>
+              <p:cNvSpPr txBox="1">
+                <a:spLocks noRot="1" noChangeAspect="1" noMove="1" noResize="1" noEditPoints="1" noAdjustHandles="1" noChangeArrowheads="1" noChangeShapeType="1" noTextEdit="1"/>
+              </p:cNvSpPr>
+              <p:nvPr/>
+            </p:nvSpPr>
+            <p:spPr>
+              <a:xfrm>
+                <a:off x="1147481" y="4493792"/>
+                <a:ext cx="9323295" cy="1998752"/>
+              </a:xfrm>
+              <a:prstGeom prst="rect">
+                <a:avLst/>
+              </a:prstGeom>
+              <a:blipFill>
+                <a:blip r:embed="rId3"/>
+                <a:stretch>
+                  <a:fillRect l="-523" t="-1524"/>
+                </a:stretch>
+              </a:blipFill>
+            </p:spPr>
+            <p:txBody>
+              <a:bodyPr/>
+              <a:lstStyle/>
+              <a:p>
+                <a:r>
+                  <a:rPr lang="fr-FR">
+                    <a:noFill/>
+                  </a:rPr>
+                  <a:t> </a:t>
+                </a:r>
+              </a:p>
+            </p:txBody>
+          </p:sp>
+        </mc:Fallback>
+      </mc:AlternateContent>
+    </p:spTree>
+    <p:extLst>
+      <p:ext uri="{BB962C8B-B14F-4D97-AF65-F5344CB8AC3E}">
+        <p14:creationId xmlns:p14="http://schemas.microsoft.com/office/powerpoint/2010/main" val="3829648558"/>
+      </p:ext>
+    </p:extLst>
+  </p:cSld>
+  <p:clrMapOvr>
+    <a:masterClrMapping/>
+  </p:clrMapOvr>
+</p:sld>
+</file>
+
+<file path=ppt/slides/slide5.xml><?xml version="1.0" encoding="utf-8"?>
+<p:sld xmlns:a="http://schemas.openxmlformats.org/drawingml/2006/main" xmlns:r="http://schemas.openxmlformats.org/officeDocument/2006/relationships" xmlns:p="http://schemas.openxmlformats.org/presentationml/2006/main">
+  <p:cSld>
+    <p:spTree>
+      <p:nvGrpSpPr>
+        <p:cNvPr id="1" name=""/>
+        <p:cNvGrpSpPr/>
+        <p:nvPr/>
+      </p:nvGrpSpPr>
+      <p:grpSpPr>
+        <a:xfrm>
+          <a:off x="0" y="0"/>
+          <a:ext cx="0" cy="0"/>
+          <a:chOff x="0" y="0"/>
+          <a:chExt cx="0" cy="0"/>
+        </a:xfrm>
+      </p:grpSpPr>
+      <p:sp>
+        <p:nvSpPr>
+          <p:cNvPr id="2" name="Titre 1">
+            <a:extLst>
+              <a:ext uri="{FF2B5EF4-FFF2-40B4-BE49-F238E27FC236}">
+                <a16:creationId xmlns:a16="http://schemas.microsoft.com/office/drawing/2014/main" id="{C2DADACB-8412-7E39-DDA9-7E4D065B5AFD}"/>
+              </a:ext>
+            </a:extLst>
+          </p:cNvPr>
+          <p:cNvSpPr>
+            <a:spLocks noGrp="1"/>
+          </p:cNvSpPr>
+          <p:nvPr>
+            <p:ph type="title"/>
+          </p:nvPr>
+        </p:nvSpPr>
+        <p:spPr/>
+        <p:txBody>
+          <a:bodyPr/>
+          <a:lstStyle/>
+          <a:p>
+            <a:r>
+              <a:rPr lang="fr-FR" dirty="0" err="1"/>
+              <a:t>Physics</a:t>
+            </a:r>
+            <a:r>
+              <a:rPr lang="fr-FR" dirty="0"/>
+              <a:t> : </a:t>
+            </a:r>
+            <a:r>
+              <a:rPr lang="fr-FR" dirty="0" err="1"/>
+              <a:t>turn</a:t>
+            </a:r>
+            <a:r>
+              <a:rPr lang="fr-FR" dirty="0"/>
+              <a:t> rate</a:t>
+            </a:r>
+          </a:p>
+        </p:txBody>
+      </p:sp>
+      <p:sp>
+        <p:nvSpPr>
+          <p:cNvPr id="3" name="Espace réservé du contenu 2">
+            <a:extLst>
+              <a:ext uri="{FF2B5EF4-FFF2-40B4-BE49-F238E27FC236}">
+                <a16:creationId xmlns:a16="http://schemas.microsoft.com/office/drawing/2014/main" id="{43195F99-32DA-B6F1-8186-116E449A7844}"/>
+              </a:ext>
+            </a:extLst>
+          </p:cNvPr>
+          <p:cNvSpPr>
+            <a:spLocks noGrp="1"/>
+          </p:cNvSpPr>
+          <p:nvPr>
+            <p:ph idx="1"/>
+          </p:nvPr>
+        </p:nvSpPr>
+        <p:spPr/>
+        <p:txBody>
+          <a:bodyPr/>
+          <a:lstStyle/>
+          <a:p>
+            <a:pPr marL="0" indent="0">
+              <a:buNone/>
+            </a:pPr>
+            <a:r>
+              <a:rPr lang="en-US" dirty="0"/>
+              <a:t>TO DO : Mathematical relation between the speed of the plane, the maximal acceleration in g of the plane to find the turn rate in degrees per </a:t>
+            </a:r>
+            <a:r>
+              <a:rPr lang="en-US" dirty="0" err="1"/>
+              <a:t>secondes</a:t>
+            </a:r>
+            <a:endParaRPr lang="en-US" dirty="0"/>
+          </a:p>
+        </p:txBody>
+      </p:sp>
+    </p:spTree>
+    <p:extLst>
+      <p:ext uri="{BB962C8B-B14F-4D97-AF65-F5344CB8AC3E}">
+        <p14:creationId xmlns:p14="http://schemas.microsoft.com/office/powerpoint/2010/main" val="4198383093"/>
+      </p:ext>
+    </p:extLst>
+  </p:cSld>
+  <p:clrMapOvr>
+    <a:masterClrMapping/>
+  </p:clrMapOvr>
+</p:sld>
+</file>
+
+<file path=ppt/slides/slide6.xml><?xml version="1.0" encoding="utf-8"?>
+<p:sld xmlns:a="http://schemas.openxmlformats.org/drawingml/2006/main" xmlns:r="http://schemas.openxmlformats.org/officeDocument/2006/relationships" xmlns:p="http://schemas.openxmlformats.org/presentationml/2006/main">
+  <p:cSld>
+    <p:spTree>
+      <p:nvGrpSpPr>
+        <p:cNvPr id="1" name=""/>
+        <p:cNvGrpSpPr/>
+        <p:nvPr/>
+      </p:nvGrpSpPr>
+      <p:grpSpPr>
+        <a:xfrm>
+          <a:off x="0" y="0"/>
+          <a:ext cx="0" cy="0"/>
+          <a:chOff x="0" y="0"/>
+          <a:chExt cx="0" cy="0"/>
+        </a:xfrm>
+      </p:grpSpPr>
+      <p:sp>
+        <p:nvSpPr>
+          <p:cNvPr id="2" name="Titre 1">
+            <a:extLst>
+              <a:ext uri="{FF2B5EF4-FFF2-40B4-BE49-F238E27FC236}">
+                <a16:creationId xmlns:a16="http://schemas.microsoft.com/office/drawing/2014/main" id="{C2DADACB-8412-7E39-DDA9-7E4D065B5AFD}"/>
+              </a:ext>
+            </a:extLst>
+          </p:cNvPr>
+          <p:cNvSpPr>
+            <a:spLocks noGrp="1"/>
+          </p:cNvSpPr>
+          <p:nvPr>
+            <p:ph type="title"/>
+          </p:nvPr>
+        </p:nvSpPr>
+        <p:spPr/>
+        <p:txBody>
+          <a:bodyPr/>
+          <a:lstStyle/>
+          <a:p>
+            <a:r>
+              <a:rPr lang="fr-FR" dirty="0" err="1"/>
+              <a:t>Automatics</a:t>
+            </a:r>
+            <a:r>
+              <a:rPr lang="fr-FR" dirty="0"/>
+              <a:t> : </a:t>
+            </a:r>
+            <a:r>
+              <a:rPr lang="fr-FR" dirty="0" err="1"/>
+              <a:t>Determinist</a:t>
+            </a:r>
+            <a:r>
+              <a:rPr lang="fr-FR" dirty="0"/>
+              <a:t> model for an </a:t>
+            </a:r>
+            <a:r>
+              <a:rPr lang="fr-FR" dirty="0" err="1"/>
+              <a:t>autopilot</a:t>
+            </a:r>
+            <a:endParaRPr lang="fr-FR" dirty="0"/>
+          </a:p>
+        </p:txBody>
+      </p:sp>
+      <p:sp>
+        <p:nvSpPr>
+          <p:cNvPr id="3" name="Espace réservé du contenu 2">
+            <a:extLst>
+              <a:ext uri="{FF2B5EF4-FFF2-40B4-BE49-F238E27FC236}">
+                <a16:creationId xmlns:a16="http://schemas.microsoft.com/office/drawing/2014/main" id="{43195F99-32DA-B6F1-8186-116E449A7844}"/>
+              </a:ext>
+            </a:extLst>
+          </p:cNvPr>
+          <p:cNvSpPr>
+            <a:spLocks noGrp="1"/>
+          </p:cNvSpPr>
+          <p:nvPr>
+            <p:ph idx="1"/>
+          </p:nvPr>
+        </p:nvSpPr>
+        <p:spPr/>
+        <p:txBody>
+          <a:bodyPr/>
+          <a:lstStyle/>
+          <a:p>
+            <a:pPr marL="0" indent="0">
+              <a:buNone/>
+            </a:pPr>
+            <a:r>
+              <a:rPr lang="en-US" dirty="0"/>
+              <a:t>TO DO : Build transfers function for a determinist autopilot (consign for heading by using the turn command, consign of speed using the throttle command).</a:t>
+            </a:r>
+          </a:p>
+        </p:txBody>
+      </p:sp>
+    </p:spTree>
+    <p:extLst>
+      <p:ext uri="{BB962C8B-B14F-4D97-AF65-F5344CB8AC3E}">
+        <p14:creationId xmlns:p14="http://schemas.microsoft.com/office/powerpoint/2010/main" val="2552365790"/>
       </p:ext>
     </p:extLst>
   </p:cSld>

</xml_diff>